<commit_message>
figure d'aiuto per la comprensione della forma d'onda
</commit_message>
<xml_diff>
--- a/Report/Figures.pptx
+++ b/Report/Figures.pptx
@@ -275,7 +275,7 @@
           <a:p>
             <a:fld id="{4DAA0097-81A9-445B-865C-4B93A7260298}" type="datetimeFigureOut">
               <a:rPr lang="it-IT" smtClean="0"/>
-              <a:t>21/12/2020</a:t>
+              <a:t>22/12/2020</a:t>
             </a:fld>
             <a:endParaRPr lang="it-IT"/>
           </a:p>
@@ -473,7 +473,7 @@
           <a:p>
             <a:fld id="{4DAA0097-81A9-445B-865C-4B93A7260298}" type="datetimeFigureOut">
               <a:rPr lang="it-IT" smtClean="0"/>
-              <a:t>21/12/2020</a:t>
+              <a:t>22/12/2020</a:t>
             </a:fld>
             <a:endParaRPr lang="it-IT"/>
           </a:p>
@@ -681,7 +681,7 @@
           <a:p>
             <a:fld id="{4DAA0097-81A9-445B-865C-4B93A7260298}" type="datetimeFigureOut">
               <a:rPr lang="it-IT" smtClean="0"/>
-              <a:t>21/12/2020</a:t>
+              <a:t>22/12/2020</a:t>
             </a:fld>
             <a:endParaRPr lang="it-IT"/>
           </a:p>
@@ -879,7 +879,7 @@
           <a:p>
             <a:fld id="{4DAA0097-81A9-445B-865C-4B93A7260298}" type="datetimeFigureOut">
               <a:rPr lang="it-IT" smtClean="0"/>
-              <a:t>21/12/2020</a:t>
+              <a:t>22/12/2020</a:t>
             </a:fld>
             <a:endParaRPr lang="it-IT"/>
           </a:p>
@@ -1154,7 +1154,7 @@
           <a:p>
             <a:fld id="{4DAA0097-81A9-445B-865C-4B93A7260298}" type="datetimeFigureOut">
               <a:rPr lang="it-IT" smtClean="0"/>
-              <a:t>21/12/2020</a:t>
+              <a:t>22/12/2020</a:t>
             </a:fld>
             <a:endParaRPr lang="it-IT"/>
           </a:p>
@@ -1419,7 +1419,7 @@
           <a:p>
             <a:fld id="{4DAA0097-81A9-445B-865C-4B93A7260298}" type="datetimeFigureOut">
               <a:rPr lang="it-IT" smtClean="0"/>
-              <a:t>21/12/2020</a:t>
+              <a:t>22/12/2020</a:t>
             </a:fld>
             <a:endParaRPr lang="it-IT"/>
           </a:p>
@@ -1831,7 +1831,7 @@
           <a:p>
             <a:fld id="{4DAA0097-81A9-445B-865C-4B93A7260298}" type="datetimeFigureOut">
               <a:rPr lang="it-IT" smtClean="0"/>
-              <a:t>21/12/2020</a:t>
+              <a:t>22/12/2020</a:t>
             </a:fld>
             <a:endParaRPr lang="it-IT"/>
           </a:p>
@@ -1972,7 +1972,7 @@
           <a:p>
             <a:fld id="{4DAA0097-81A9-445B-865C-4B93A7260298}" type="datetimeFigureOut">
               <a:rPr lang="it-IT" smtClean="0"/>
-              <a:t>21/12/2020</a:t>
+              <a:t>22/12/2020</a:t>
             </a:fld>
             <a:endParaRPr lang="it-IT"/>
           </a:p>
@@ -2085,7 +2085,7 @@
           <a:p>
             <a:fld id="{4DAA0097-81A9-445B-865C-4B93A7260298}" type="datetimeFigureOut">
               <a:rPr lang="it-IT" smtClean="0"/>
-              <a:t>21/12/2020</a:t>
+              <a:t>22/12/2020</a:t>
             </a:fld>
             <a:endParaRPr lang="it-IT"/>
           </a:p>
@@ -2396,7 +2396,7 @@
           <a:p>
             <a:fld id="{4DAA0097-81A9-445B-865C-4B93A7260298}" type="datetimeFigureOut">
               <a:rPr lang="it-IT" smtClean="0"/>
-              <a:t>21/12/2020</a:t>
+              <a:t>22/12/2020</a:t>
             </a:fld>
             <a:endParaRPr lang="it-IT"/>
           </a:p>
@@ -2684,7 +2684,7 @@
           <a:p>
             <a:fld id="{4DAA0097-81A9-445B-865C-4B93A7260298}" type="datetimeFigureOut">
               <a:rPr lang="it-IT" smtClean="0"/>
-              <a:t>21/12/2020</a:t>
+              <a:t>22/12/2020</a:t>
             </a:fld>
             <a:endParaRPr lang="it-IT"/>
           </a:p>
@@ -2925,7 +2925,7 @@
           <a:p>
             <a:fld id="{4DAA0097-81A9-445B-865C-4B93A7260298}" type="datetimeFigureOut">
               <a:rPr lang="it-IT" smtClean="0"/>
-              <a:t>21/12/2020</a:t>
+              <a:t>22/12/2020</a:t>
             </a:fld>
             <a:endParaRPr lang="it-IT"/>
           </a:p>
@@ -5159,7 +5159,7 @@
         </p:nvSpPr>
         <p:spPr>
           <a:xfrm flipH="1">
-            <a:off x="305157" y="1653042"/>
+            <a:off x="368197" y="637146"/>
             <a:ext cx="3800559" cy="2862322"/>
           </a:xfrm>
           <a:prstGeom prst="rect">

</xml_diff>